<commit_message>
added a bit about acclimation
</commit_message>
<xml_diff>
--- a/Readings/Discussion_slides/src/week4_Atkin2003.pptx
+++ b/Readings/Discussion_slides/src/week4_Atkin2003.pptx
@@ -6,14 +6,16 @@
   </p:sldMasterIdLst>
   <p:sldIdLst>
     <p:sldId id="256" r:id="rId2"/>
-    <p:sldId id="264" r:id="rId3"/>
-    <p:sldId id="263" r:id="rId4"/>
-    <p:sldId id="257" r:id="rId5"/>
-    <p:sldId id="262" r:id="rId6"/>
-    <p:sldId id="258" r:id="rId7"/>
-    <p:sldId id="259" r:id="rId8"/>
-    <p:sldId id="260" r:id="rId9"/>
-    <p:sldId id="261" r:id="rId10"/>
+    <p:sldId id="265" r:id="rId3"/>
+    <p:sldId id="266" r:id="rId4"/>
+    <p:sldId id="264" r:id="rId5"/>
+    <p:sldId id="263" r:id="rId6"/>
+    <p:sldId id="257" r:id="rId7"/>
+    <p:sldId id="262" r:id="rId8"/>
+    <p:sldId id="258" r:id="rId9"/>
+    <p:sldId id="259" r:id="rId10"/>
+    <p:sldId id="260" r:id="rId11"/>
+    <p:sldId id="261" r:id="rId12"/>
   </p:sldIdLst>
   <p:sldSz cx="12192000" cy="6858000"/>
   <p:notesSz cx="6858000" cy="9144000"/>
@@ -112,6 +114,11 @@
       </a:defRPr>
     </a:lvl9pPr>
   </p:defaultTextStyle>
+  <p:extLst>
+    <p:ext uri="{EFAFB233-063F-42B5-8137-9DF3F51BA10A}">
+      <p15:sldGuideLst xmlns:p15="http://schemas.microsoft.com/office/powerpoint/2012/main"/>
+    </p:ext>
+  </p:extLst>
 </p:presentation>
 </file>
 
@@ -262,7 +269,7 @@
           <a:p>
             <a:fld id="{AE5C69F3-6CF1-AE4A-8448-C1D8E3D4ABD0}" type="datetimeFigureOut">
               <a:rPr lang="en-US" smtClean="0"/>
-              <a:t>2/11/19</a:t>
+              <a:t>2/12/19</a:t>
             </a:fld>
             <a:endParaRPr lang="en-US"/>
           </a:p>
@@ -460,7 +467,7 @@
           <a:p>
             <a:fld id="{AE5C69F3-6CF1-AE4A-8448-C1D8E3D4ABD0}" type="datetimeFigureOut">
               <a:rPr lang="en-US" smtClean="0"/>
-              <a:t>2/11/19</a:t>
+              <a:t>2/12/19</a:t>
             </a:fld>
             <a:endParaRPr lang="en-US"/>
           </a:p>
@@ -668,7 +675,7 @@
           <a:p>
             <a:fld id="{AE5C69F3-6CF1-AE4A-8448-C1D8E3D4ABD0}" type="datetimeFigureOut">
               <a:rPr lang="en-US" smtClean="0"/>
-              <a:t>2/11/19</a:t>
+              <a:t>2/12/19</a:t>
             </a:fld>
             <a:endParaRPr lang="en-US"/>
           </a:p>
@@ -866,7 +873,7 @@
           <a:p>
             <a:fld id="{AE5C69F3-6CF1-AE4A-8448-C1D8E3D4ABD0}" type="datetimeFigureOut">
               <a:rPr lang="en-US" smtClean="0"/>
-              <a:t>2/11/19</a:t>
+              <a:t>2/12/19</a:t>
             </a:fld>
             <a:endParaRPr lang="en-US"/>
           </a:p>
@@ -1141,7 +1148,7 @@
           <a:p>
             <a:fld id="{AE5C69F3-6CF1-AE4A-8448-C1D8E3D4ABD0}" type="datetimeFigureOut">
               <a:rPr lang="en-US" smtClean="0"/>
-              <a:t>2/11/19</a:t>
+              <a:t>2/12/19</a:t>
             </a:fld>
             <a:endParaRPr lang="en-US"/>
           </a:p>
@@ -1406,7 +1413,7 @@
           <a:p>
             <a:fld id="{AE5C69F3-6CF1-AE4A-8448-C1D8E3D4ABD0}" type="datetimeFigureOut">
               <a:rPr lang="en-US" smtClean="0"/>
-              <a:t>2/11/19</a:t>
+              <a:t>2/12/19</a:t>
             </a:fld>
             <a:endParaRPr lang="en-US"/>
           </a:p>
@@ -1818,7 +1825,7 @@
           <a:p>
             <a:fld id="{AE5C69F3-6CF1-AE4A-8448-C1D8E3D4ABD0}" type="datetimeFigureOut">
               <a:rPr lang="en-US" smtClean="0"/>
-              <a:t>2/11/19</a:t>
+              <a:t>2/12/19</a:t>
             </a:fld>
             <a:endParaRPr lang="en-US"/>
           </a:p>
@@ -1959,7 +1966,7 @@
           <a:p>
             <a:fld id="{AE5C69F3-6CF1-AE4A-8448-C1D8E3D4ABD0}" type="datetimeFigureOut">
               <a:rPr lang="en-US" smtClean="0"/>
-              <a:t>2/11/19</a:t>
+              <a:t>2/12/19</a:t>
             </a:fld>
             <a:endParaRPr lang="en-US"/>
           </a:p>
@@ -2072,7 +2079,7 @@
           <a:p>
             <a:fld id="{AE5C69F3-6CF1-AE4A-8448-C1D8E3D4ABD0}" type="datetimeFigureOut">
               <a:rPr lang="en-US" smtClean="0"/>
-              <a:t>2/11/19</a:t>
+              <a:t>2/12/19</a:t>
             </a:fld>
             <a:endParaRPr lang="en-US"/>
           </a:p>
@@ -2383,7 +2390,7 @@
           <a:p>
             <a:fld id="{AE5C69F3-6CF1-AE4A-8448-C1D8E3D4ABD0}" type="datetimeFigureOut">
               <a:rPr lang="en-US" smtClean="0"/>
-              <a:t>2/11/19</a:t>
+              <a:t>2/12/19</a:t>
             </a:fld>
             <a:endParaRPr lang="en-US"/>
           </a:p>
@@ -2671,7 +2678,7 @@
           <a:p>
             <a:fld id="{AE5C69F3-6CF1-AE4A-8448-C1D8E3D4ABD0}" type="datetimeFigureOut">
               <a:rPr lang="en-US" smtClean="0"/>
-              <a:t>2/11/19</a:t>
+              <a:t>2/12/19</a:t>
             </a:fld>
             <a:endParaRPr lang="en-US"/>
           </a:p>
@@ -2912,7 +2919,7 @@
           <a:p>
             <a:fld id="{AE5C69F3-6CF1-AE4A-8448-C1D8E3D4ABD0}" type="datetimeFigureOut">
               <a:rPr lang="en-US" smtClean="0"/>
-              <a:t>2/11/19</a:t>
+              <a:t>2/12/19</a:t>
             </a:fld>
             <a:endParaRPr lang="en-US"/>
           </a:p>
@@ -3425,6 +3432,126 @@
 </p:sld>
 </file>
 
+<file path=ppt/slides/slide10.xml><?xml version="1.0" encoding="utf-8"?>
+<p:sld xmlns:a="http://schemas.openxmlformats.org/drawingml/2006/main" xmlns:r="http://schemas.openxmlformats.org/officeDocument/2006/relationships" xmlns:p="http://schemas.openxmlformats.org/presentationml/2006/main">
+  <p:cSld>
+    <p:spTree>
+      <p:nvGrpSpPr>
+        <p:cNvPr id="1" name=""/>
+        <p:cNvGrpSpPr/>
+        <p:nvPr/>
+      </p:nvGrpSpPr>
+      <p:grpSpPr>
+        <a:xfrm>
+          <a:off x="0" y="0"/>
+          <a:ext cx="0" cy="0"/>
+          <a:chOff x="0" y="0"/>
+          <a:chExt cx="0" cy="0"/>
+        </a:xfrm>
+      </p:grpSpPr>
+      <p:pic>
+        <p:nvPicPr>
+          <p:cNvPr id="2" name="Picture 1">
+            <a:extLst>
+              <a:ext uri="{FF2B5EF4-FFF2-40B4-BE49-F238E27FC236}">
+                <a16:creationId xmlns:a16="http://schemas.microsoft.com/office/drawing/2014/main" id="{EFF9A4F3-9FB7-7249-9F38-48815D172E52}"/>
+              </a:ext>
+            </a:extLst>
+          </p:cNvPr>
+          <p:cNvPicPr>
+            <a:picLocks noChangeAspect="1"/>
+          </p:cNvPicPr>
+          <p:nvPr/>
+        </p:nvPicPr>
+        <p:blipFill>
+          <a:blip r:embed="rId2"/>
+          <a:stretch>
+            <a:fillRect/>
+          </a:stretch>
+        </p:blipFill>
+        <p:spPr>
+          <a:xfrm>
+            <a:off x="4410408" y="0"/>
+            <a:ext cx="3371183" cy="6858000"/>
+          </a:xfrm>
+          <a:prstGeom prst="rect">
+            <a:avLst/>
+          </a:prstGeom>
+        </p:spPr>
+      </p:pic>
+    </p:spTree>
+    <p:extLst>
+      <p:ext uri="{BB962C8B-B14F-4D97-AF65-F5344CB8AC3E}">
+        <p14:creationId xmlns:p14="http://schemas.microsoft.com/office/powerpoint/2010/main" val="832360290"/>
+      </p:ext>
+    </p:extLst>
+  </p:cSld>
+  <p:clrMapOvr>
+    <a:masterClrMapping/>
+  </p:clrMapOvr>
+</p:sld>
+</file>
+
+<file path=ppt/slides/slide11.xml><?xml version="1.0" encoding="utf-8"?>
+<p:sld xmlns:a="http://schemas.openxmlformats.org/drawingml/2006/main" xmlns:r="http://schemas.openxmlformats.org/officeDocument/2006/relationships" xmlns:p="http://schemas.openxmlformats.org/presentationml/2006/main">
+  <p:cSld>
+    <p:spTree>
+      <p:nvGrpSpPr>
+        <p:cNvPr id="1" name=""/>
+        <p:cNvGrpSpPr/>
+        <p:nvPr/>
+      </p:nvGrpSpPr>
+      <p:grpSpPr>
+        <a:xfrm>
+          <a:off x="0" y="0"/>
+          <a:ext cx="0" cy="0"/>
+          <a:chOff x="0" y="0"/>
+          <a:chExt cx="0" cy="0"/>
+        </a:xfrm>
+      </p:grpSpPr>
+      <p:pic>
+        <p:nvPicPr>
+          <p:cNvPr id="2" name="Picture 1">
+            <a:extLst>
+              <a:ext uri="{FF2B5EF4-FFF2-40B4-BE49-F238E27FC236}">
+                <a16:creationId xmlns:a16="http://schemas.microsoft.com/office/drawing/2014/main" id="{275156C4-E9BC-584E-A275-237CC6FFE950}"/>
+              </a:ext>
+            </a:extLst>
+          </p:cNvPr>
+          <p:cNvPicPr>
+            <a:picLocks noChangeAspect="1"/>
+          </p:cNvPicPr>
+          <p:nvPr/>
+        </p:nvPicPr>
+        <p:blipFill>
+          <a:blip r:embed="rId2"/>
+          <a:stretch>
+            <a:fillRect/>
+          </a:stretch>
+        </p:blipFill>
+        <p:spPr>
+          <a:xfrm>
+            <a:off x="3727450" y="552450"/>
+            <a:ext cx="4737100" cy="5753100"/>
+          </a:xfrm>
+          <a:prstGeom prst="rect">
+            <a:avLst/>
+          </a:prstGeom>
+        </p:spPr>
+      </p:pic>
+    </p:spTree>
+    <p:extLst>
+      <p:ext uri="{BB962C8B-B14F-4D97-AF65-F5344CB8AC3E}">
+        <p14:creationId xmlns:p14="http://schemas.microsoft.com/office/powerpoint/2010/main" val="307695250"/>
+      </p:ext>
+    </p:extLst>
+  </p:cSld>
+  <p:clrMapOvr>
+    <a:masterClrMapping/>
+  </p:clrMapOvr>
+</p:sld>
+</file>
+
 <file path=ppt/slides/slide2.xml><?xml version="1.0" encoding="utf-8"?>
 <p:sld xmlns:a="http://schemas.openxmlformats.org/drawingml/2006/main" xmlns:r="http://schemas.openxmlformats.org/officeDocument/2006/relationships" xmlns:p="http://schemas.openxmlformats.org/presentationml/2006/main">
   <p:cSld>
@@ -3447,7 +3574,7 @@
           <p:cNvPr id="2" name="Title 1">
             <a:extLst>
               <a:ext uri="{FF2B5EF4-FFF2-40B4-BE49-F238E27FC236}">
-                <a16:creationId xmlns:a16="http://schemas.microsoft.com/office/drawing/2014/main" id="{BF96BC3B-5753-CF4E-BA93-3892FF60AB3A}"/>
+                <a16:creationId xmlns:a16="http://schemas.microsoft.com/office/drawing/2014/main" id="{5A61096E-BFA5-0E4A-B4D2-043733D65F69}"/>
               </a:ext>
             </a:extLst>
           </p:cNvPr>
@@ -3465,45 +3592,40 @@
           <a:p>
             <a:r>
               <a:rPr lang="en-US" dirty="0"/>
-              <a:t>It turns out acclimation can be quite variable</a:t>
-            </a:r>
-          </a:p>
-        </p:txBody>
-      </p:sp>
-      <p:pic>
-        <p:nvPicPr>
-          <p:cNvPr id="3" name="Picture 2">
-            <a:extLst>
-              <a:ext uri="{FF2B5EF4-FFF2-40B4-BE49-F238E27FC236}">
-                <a16:creationId xmlns:a16="http://schemas.microsoft.com/office/drawing/2014/main" id="{F2821005-56FE-4942-BB12-75ABCB9B4B21}"/>
-              </a:ext>
-            </a:extLst>
-          </p:cNvPr>
-          <p:cNvPicPr>
-            <a:picLocks noChangeAspect="1"/>
-          </p:cNvPicPr>
-          <p:nvPr/>
-        </p:nvPicPr>
-        <p:blipFill>
-          <a:blip r:embed="rId2"/>
-          <a:stretch>
-            <a:fillRect/>
-          </a:stretch>
-        </p:blipFill>
-        <p:spPr>
-          <a:xfrm>
-            <a:off x="4581951" y="1310186"/>
-            <a:ext cx="3028097" cy="5356746"/>
-          </a:xfrm>
-          <a:prstGeom prst="rect">
-            <a:avLst/>
-          </a:prstGeom>
-        </p:spPr>
-      </p:pic>
+              <a:t>Let’s talk about acclimation</a:t>
+            </a:r>
+          </a:p>
+        </p:txBody>
+      </p:sp>
+      <p:sp>
+        <p:nvSpPr>
+          <p:cNvPr id="3" name="Text Placeholder 2">
+            <a:extLst>
+              <a:ext uri="{FF2B5EF4-FFF2-40B4-BE49-F238E27FC236}">
+                <a16:creationId xmlns:a16="http://schemas.microsoft.com/office/drawing/2014/main" id="{2C6A5C62-FF49-4C4A-B45B-08548196340E}"/>
+              </a:ext>
+            </a:extLst>
+          </p:cNvPr>
+          <p:cNvSpPr>
+            <a:spLocks noGrp="1"/>
+          </p:cNvSpPr>
+          <p:nvPr>
+            <p:ph type="body" idx="1"/>
+          </p:nvPr>
+        </p:nvSpPr>
+        <p:spPr/>
+        <p:txBody>
+          <a:bodyPr/>
+          <a:lstStyle/>
+          <a:p>
+            <a:endParaRPr lang="en-US"/>
+          </a:p>
+        </p:txBody>
+      </p:sp>
     </p:spTree>
     <p:extLst>
       <p:ext uri="{BB962C8B-B14F-4D97-AF65-F5344CB8AC3E}">
-        <p14:creationId xmlns:p14="http://schemas.microsoft.com/office/powerpoint/2010/main" val="3869775848"/>
+        <p14:creationId xmlns:p14="http://schemas.microsoft.com/office/powerpoint/2010/main" val="2406296239"/>
       </p:ext>
     </p:extLst>
   </p:cSld>
@@ -3535,7 +3657,7 @@
           <p:cNvPr id="2" name="Title 1">
             <a:extLst>
               <a:ext uri="{FF2B5EF4-FFF2-40B4-BE49-F238E27FC236}">
-                <a16:creationId xmlns:a16="http://schemas.microsoft.com/office/drawing/2014/main" id="{DC606C74-BA84-4C43-BFAE-A8F68479CD8C}"/>
+                <a16:creationId xmlns:a16="http://schemas.microsoft.com/office/drawing/2014/main" id="{938C6372-0944-EF4C-975F-C3A1B0BEFF4B}"/>
               </a:ext>
             </a:extLst>
           </p:cNvPr>
@@ -3553,7 +3675,79 @@
           <a:p>
             <a:r>
               <a:rPr lang="en-US" dirty="0"/>
-              <a:t>Given what you know about temperature responses: Why would plants acclimate?</a:t>
+              <a:t>Seems pretty cut and dry!</a:t>
+            </a:r>
+          </a:p>
+        </p:txBody>
+      </p:sp>
+      <p:pic>
+        <p:nvPicPr>
+          <p:cNvPr id="3" name="Picture 2">
+            <a:extLst>
+              <a:ext uri="{FF2B5EF4-FFF2-40B4-BE49-F238E27FC236}">
+                <a16:creationId xmlns:a16="http://schemas.microsoft.com/office/drawing/2014/main" id="{9E9449D7-8F65-284C-8E86-64F6D2103F25}"/>
+              </a:ext>
+            </a:extLst>
+          </p:cNvPr>
+          <p:cNvPicPr>
+            <a:picLocks noChangeAspect="1"/>
+          </p:cNvPicPr>
+          <p:nvPr/>
+        </p:nvPicPr>
+        <p:blipFill rotWithShape="1">
+          <a:blip r:embed="rId2"/>
+          <a:srcRect b="33533"/>
+          <a:stretch/>
+        </p:blipFill>
+        <p:spPr>
+          <a:xfrm>
+            <a:off x="4232987" y="1690688"/>
+            <a:ext cx="3371183" cy="4558352"/>
+          </a:xfrm>
+          <a:prstGeom prst="rect">
+            <a:avLst/>
+          </a:prstGeom>
+        </p:spPr>
+      </p:pic>
+      <p:sp>
+        <p:nvSpPr>
+          <p:cNvPr id="4" name="TextBox 3">
+            <a:extLst>
+              <a:ext uri="{FF2B5EF4-FFF2-40B4-BE49-F238E27FC236}">
+                <a16:creationId xmlns:a16="http://schemas.microsoft.com/office/drawing/2014/main" id="{587691AC-0457-AB44-A2F2-38B2A05AEDB4}"/>
+              </a:ext>
+            </a:extLst>
+          </p:cNvPr>
+          <p:cNvSpPr txBox="1"/>
+          <p:nvPr/>
+        </p:nvSpPr>
+        <p:spPr>
+          <a:xfrm>
+            <a:off x="9850140" y="6487033"/>
+            <a:ext cx="2341860" cy="369332"/>
+          </a:xfrm>
+          <a:prstGeom prst="rect">
+            <a:avLst/>
+          </a:prstGeom>
+          <a:noFill/>
+        </p:spPr>
+        <p:txBody>
+          <a:bodyPr wrap="none" rtlCol="0">
+            <a:spAutoFit/>
+          </a:bodyPr>
+          <a:lstStyle/>
+          <a:p>
+            <a:r>
+              <a:rPr lang="en-US" dirty="0"/>
+              <a:t>Atkin &amp; </a:t>
+            </a:r>
+            <a:r>
+              <a:rPr lang="en-US" dirty="0" err="1"/>
+              <a:t>Tjoelker</a:t>
+            </a:r>
+            <a:r>
+              <a:rPr lang="en-US" dirty="0"/>
+              <a:t> (2003)</a:t>
             </a:r>
           </a:p>
         </p:txBody>
@@ -3561,7 +3755,7 @@
     </p:spTree>
     <p:extLst>
       <p:ext uri="{BB962C8B-B14F-4D97-AF65-F5344CB8AC3E}">
-        <p14:creationId xmlns:p14="http://schemas.microsoft.com/office/powerpoint/2010/main" val="2394313258"/>
+        <p14:creationId xmlns:p14="http://schemas.microsoft.com/office/powerpoint/2010/main" val="3315589880"/>
       </p:ext>
     </p:extLst>
   </p:cSld>
@@ -3593,6 +3787,191 @@
           <p:cNvPr id="2" name="Title 1">
             <a:extLst>
               <a:ext uri="{FF2B5EF4-FFF2-40B4-BE49-F238E27FC236}">
+                <a16:creationId xmlns:a16="http://schemas.microsoft.com/office/drawing/2014/main" id="{BF96BC3B-5753-CF4E-BA93-3892FF60AB3A}"/>
+              </a:ext>
+            </a:extLst>
+          </p:cNvPr>
+          <p:cNvSpPr>
+            <a:spLocks noGrp="1"/>
+          </p:cNvSpPr>
+          <p:nvPr>
+            <p:ph type="title"/>
+          </p:nvPr>
+        </p:nvSpPr>
+        <p:spPr/>
+        <p:txBody>
+          <a:bodyPr/>
+          <a:lstStyle/>
+          <a:p>
+            <a:r>
+              <a:rPr lang="en-US" dirty="0"/>
+              <a:t>It turns out acclimation can be quite variable</a:t>
+            </a:r>
+          </a:p>
+        </p:txBody>
+      </p:sp>
+      <p:pic>
+        <p:nvPicPr>
+          <p:cNvPr id="3" name="Picture 2">
+            <a:extLst>
+              <a:ext uri="{FF2B5EF4-FFF2-40B4-BE49-F238E27FC236}">
+                <a16:creationId xmlns:a16="http://schemas.microsoft.com/office/drawing/2014/main" id="{F2821005-56FE-4942-BB12-75ABCB9B4B21}"/>
+              </a:ext>
+            </a:extLst>
+          </p:cNvPr>
+          <p:cNvPicPr>
+            <a:picLocks noChangeAspect="1"/>
+          </p:cNvPicPr>
+          <p:nvPr/>
+        </p:nvPicPr>
+        <p:blipFill>
+          <a:blip r:embed="rId2"/>
+          <a:stretch>
+            <a:fillRect/>
+          </a:stretch>
+        </p:blipFill>
+        <p:spPr>
+          <a:xfrm>
+            <a:off x="4581951" y="1310186"/>
+            <a:ext cx="3028097" cy="5356746"/>
+          </a:xfrm>
+          <a:prstGeom prst="rect">
+            <a:avLst/>
+          </a:prstGeom>
+        </p:spPr>
+      </p:pic>
+      <p:sp>
+        <p:nvSpPr>
+          <p:cNvPr id="4" name="TextBox 3">
+            <a:extLst>
+              <a:ext uri="{FF2B5EF4-FFF2-40B4-BE49-F238E27FC236}">
+                <a16:creationId xmlns:a16="http://schemas.microsoft.com/office/drawing/2014/main" id="{71B51B7F-6306-AF47-8D35-F95BE7F0CF3C}"/>
+              </a:ext>
+            </a:extLst>
+          </p:cNvPr>
+          <p:cNvSpPr txBox="1"/>
+          <p:nvPr/>
+        </p:nvSpPr>
+        <p:spPr>
+          <a:xfrm>
+            <a:off x="10180231" y="6488668"/>
+            <a:ext cx="2011769" cy="369332"/>
+          </a:xfrm>
+          <a:prstGeom prst="rect">
+            <a:avLst/>
+          </a:prstGeom>
+          <a:noFill/>
+        </p:spPr>
+        <p:txBody>
+          <a:bodyPr wrap="none" rtlCol="0">
+            <a:spAutoFit/>
+          </a:bodyPr>
+          <a:lstStyle/>
+          <a:p>
+            <a:r>
+              <a:rPr lang="en-US" dirty="0" err="1"/>
+              <a:t>Yamori</a:t>
+            </a:r>
+            <a:r>
+              <a:rPr lang="en-US" dirty="0"/>
+              <a:t> et al. (2014)</a:t>
+            </a:r>
+          </a:p>
+        </p:txBody>
+      </p:sp>
+    </p:spTree>
+    <p:extLst>
+      <p:ext uri="{BB962C8B-B14F-4D97-AF65-F5344CB8AC3E}">
+        <p14:creationId xmlns:p14="http://schemas.microsoft.com/office/powerpoint/2010/main" val="3869775848"/>
+      </p:ext>
+    </p:extLst>
+  </p:cSld>
+  <p:clrMapOvr>
+    <a:masterClrMapping/>
+  </p:clrMapOvr>
+</p:sld>
+</file>
+
+<file path=ppt/slides/slide5.xml><?xml version="1.0" encoding="utf-8"?>
+<p:sld xmlns:a="http://schemas.openxmlformats.org/drawingml/2006/main" xmlns:r="http://schemas.openxmlformats.org/officeDocument/2006/relationships" xmlns:p="http://schemas.openxmlformats.org/presentationml/2006/main">
+  <p:cSld>
+    <p:spTree>
+      <p:nvGrpSpPr>
+        <p:cNvPr id="1" name=""/>
+        <p:cNvGrpSpPr/>
+        <p:nvPr/>
+      </p:nvGrpSpPr>
+      <p:grpSpPr>
+        <a:xfrm>
+          <a:off x="0" y="0"/>
+          <a:ext cx="0" cy="0"/>
+          <a:chOff x="0" y="0"/>
+          <a:chExt cx="0" cy="0"/>
+        </a:xfrm>
+      </p:grpSpPr>
+      <p:sp>
+        <p:nvSpPr>
+          <p:cNvPr id="2" name="Title 1">
+            <a:extLst>
+              <a:ext uri="{FF2B5EF4-FFF2-40B4-BE49-F238E27FC236}">
+                <a16:creationId xmlns:a16="http://schemas.microsoft.com/office/drawing/2014/main" id="{DC606C74-BA84-4C43-BFAE-A8F68479CD8C}"/>
+              </a:ext>
+            </a:extLst>
+          </p:cNvPr>
+          <p:cNvSpPr>
+            <a:spLocks noGrp="1"/>
+          </p:cNvSpPr>
+          <p:nvPr>
+            <p:ph type="title"/>
+          </p:nvPr>
+        </p:nvSpPr>
+        <p:spPr/>
+        <p:txBody>
+          <a:bodyPr/>
+          <a:lstStyle/>
+          <a:p>
+            <a:r>
+              <a:rPr lang="en-US" dirty="0"/>
+              <a:t>Given what you know about temperature responses: Why would plants acclimate?</a:t>
+            </a:r>
+          </a:p>
+        </p:txBody>
+      </p:sp>
+    </p:spTree>
+    <p:extLst>
+      <p:ext uri="{BB962C8B-B14F-4D97-AF65-F5344CB8AC3E}">
+        <p14:creationId xmlns:p14="http://schemas.microsoft.com/office/powerpoint/2010/main" val="2394313258"/>
+      </p:ext>
+    </p:extLst>
+  </p:cSld>
+  <p:clrMapOvr>
+    <a:masterClrMapping/>
+  </p:clrMapOvr>
+</p:sld>
+</file>
+
+<file path=ppt/slides/slide6.xml><?xml version="1.0" encoding="utf-8"?>
+<p:sld xmlns:a="http://schemas.openxmlformats.org/drawingml/2006/main" xmlns:r="http://schemas.openxmlformats.org/officeDocument/2006/relationships" xmlns:p="http://schemas.openxmlformats.org/presentationml/2006/main">
+  <p:cSld>
+    <p:spTree>
+      <p:nvGrpSpPr>
+        <p:cNvPr id="1" name=""/>
+        <p:cNvGrpSpPr/>
+        <p:nvPr/>
+      </p:nvGrpSpPr>
+      <p:grpSpPr>
+        <a:xfrm>
+          <a:off x="0" y="0"/>
+          <a:ext cx="0" cy="0"/>
+          <a:chOff x="0" y="0"/>
+          <a:chExt cx="0" cy="0"/>
+        </a:xfrm>
+      </p:grpSpPr>
+      <p:sp>
+        <p:nvSpPr>
+          <p:cNvPr id="2" name="Title 1">
+            <a:extLst>
+              <a:ext uri="{FF2B5EF4-FFF2-40B4-BE49-F238E27FC236}">
                 <a16:creationId xmlns:a16="http://schemas.microsoft.com/office/drawing/2014/main" id="{ED259F69-7526-CA43-9E50-1385389E5E09}"/>
               </a:ext>
             </a:extLst>
@@ -3654,7 +4033,7 @@
 </p:sld>
 </file>
 
-<file path=ppt/slides/slide5.xml><?xml version="1.0" encoding="utf-8"?>
+<file path=ppt/slides/slide7.xml><?xml version="1.0" encoding="utf-8"?>
 <p:sld xmlns:a="http://schemas.openxmlformats.org/drawingml/2006/main" xmlns:r="http://schemas.openxmlformats.org/officeDocument/2006/relationships" xmlns:p="http://schemas.openxmlformats.org/presentationml/2006/main">
   <p:cSld>
     <p:spTree>
@@ -3714,7 +4093,7 @@
 </p:sld>
 </file>
 
-<file path=ppt/slides/slide6.xml><?xml version="1.0" encoding="utf-8"?>
+<file path=ppt/slides/slide8.xml><?xml version="1.0" encoding="utf-8"?>
 <p:sld xmlns:a="http://schemas.openxmlformats.org/drawingml/2006/main" xmlns:r="http://schemas.openxmlformats.org/officeDocument/2006/relationships" xmlns:p="http://schemas.openxmlformats.org/presentationml/2006/main">
   <p:cSld>
     <p:spTree>
@@ -3774,7 +4153,7 @@
 </p:sld>
 </file>
 
-<file path=ppt/slides/slide7.xml><?xml version="1.0" encoding="utf-8"?>
+<file path=ppt/slides/slide9.xml><?xml version="1.0" encoding="utf-8"?>
 <p:sld xmlns:a="http://schemas.openxmlformats.org/drawingml/2006/main" xmlns:r="http://schemas.openxmlformats.org/officeDocument/2006/relationships" xmlns:p="http://schemas.openxmlformats.org/presentationml/2006/main">
   <p:cSld>
     <p:spTree>
@@ -3825,126 +4204,6 @@
     <p:extLst>
       <p:ext uri="{BB962C8B-B14F-4D97-AF65-F5344CB8AC3E}">
         <p14:creationId xmlns:p14="http://schemas.microsoft.com/office/powerpoint/2010/main" val="4045957913"/>
-      </p:ext>
-    </p:extLst>
-  </p:cSld>
-  <p:clrMapOvr>
-    <a:masterClrMapping/>
-  </p:clrMapOvr>
-</p:sld>
-</file>
-
-<file path=ppt/slides/slide8.xml><?xml version="1.0" encoding="utf-8"?>
-<p:sld xmlns:a="http://schemas.openxmlformats.org/drawingml/2006/main" xmlns:r="http://schemas.openxmlformats.org/officeDocument/2006/relationships" xmlns:p="http://schemas.openxmlformats.org/presentationml/2006/main">
-  <p:cSld>
-    <p:spTree>
-      <p:nvGrpSpPr>
-        <p:cNvPr id="1" name=""/>
-        <p:cNvGrpSpPr/>
-        <p:nvPr/>
-      </p:nvGrpSpPr>
-      <p:grpSpPr>
-        <a:xfrm>
-          <a:off x="0" y="0"/>
-          <a:ext cx="0" cy="0"/>
-          <a:chOff x="0" y="0"/>
-          <a:chExt cx="0" cy="0"/>
-        </a:xfrm>
-      </p:grpSpPr>
-      <p:pic>
-        <p:nvPicPr>
-          <p:cNvPr id="2" name="Picture 1">
-            <a:extLst>
-              <a:ext uri="{FF2B5EF4-FFF2-40B4-BE49-F238E27FC236}">
-                <a16:creationId xmlns:a16="http://schemas.microsoft.com/office/drawing/2014/main" id="{EFF9A4F3-9FB7-7249-9F38-48815D172E52}"/>
-              </a:ext>
-            </a:extLst>
-          </p:cNvPr>
-          <p:cNvPicPr>
-            <a:picLocks noChangeAspect="1"/>
-          </p:cNvPicPr>
-          <p:nvPr/>
-        </p:nvPicPr>
-        <p:blipFill>
-          <a:blip r:embed="rId2"/>
-          <a:stretch>
-            <a:fillRect/>
-          </a:stretch>
-        </p:blipFill>
-        <p:spPr>
-          <a:xfrm>
-            <a:off x="4410408" y="0"/>
-            <a:ext cx="3371183" cy="6858000"/>
-          </a:xfrm>
-          <a:prstGeom prst="rect">
-            <a:avLst/>
-          </a:prstGeom>
-        </p:spPr>
-      </p:pic>
-    </p:spTree>
-    <p:extLst>
-      <p:ext uri="{BB962C8B-B14F-4D97-AF65-F5344CB8AC3E}">
-        <p14:creationId xmlns:p14="http://schemas.microsoft.com/office/powerpoint/2010/main" val="832360290"/>
-      </p:ext>
-    </p:extLst>
-  </p:cSld>
-  <p:clrMapOvr>
-    <a:masterClrMapping/>
-  </p:clrMapOvr>
-</p:sld>
-</file>
-
-<file path=ppt/slides/slide9.xml><?xml version="1.0" encoding="utf-8"?>
-<p:sld xmlns:a="http://schemas.openxmlformats.org/drawingml/2006/main" xmlns:r="http://schemas.openxmlformats.org/officeDocument/2006/relationships" xmlns:p="http://schemas.openxmlformats.org/presentationml/2006/main">
-  <p:cSld>
-    <p:spTree>
-      <p:nvGrpSpPr>
-        <p:cNvPr id="1" name=""/>
-        <p:cNvGrpSpPr/>
-        <p:nvPr/>
-      </p:nvGrpSpPr>
-      <p:grpSpPr>
-        <a:xfrm>
-          <a:off x="0" y="0"/>
-          <a:ext cx="0" cy="0"/>
-          <a:chOff x="0" y="0"/>
-          <a:chExt cx="0" cy="0"/>
-        </a:xfrm>
-      </p:grpSpPr>
-      <p:pic>
-        <p:nvPicPr>
-          <p:cNvPr id="2" name="Picture 1">
-            <a:extLst>
-              <a:ext uri="{FF2B5EF4-FFF2-40B4-BE49-F238E27FC236}">
-                <a16:creationId xmlns:a16="http://schemas.microsoft.com/office/drawing/2014/main" id="{275156C4-E9BC-584E-A275-237CC6FFE950}"/>
-              </a:ext>
-            </a:extLst>
-          </p:cNvPr>
-          <p:cNvPicPr>
-            <a:picLocks noChangeAspect="1"/>
-          </p:cNvPicPr>
-          <p:nvPr/>
-        </p:nvPicPr>
-        <p:blipFill>
-          <a:blip r:embed="rId2"/>
-          <a:stretch>
-            <a:fillRect/>
-          </a:stretch>
-        </p:blipFill>
-        <p:spPr>
-          <a:xfrm>
-            <a:off x="3727450" y="552450"/>
-            <a:ext cx="4737100" cy="5753100"/>
-          </a:xfrm>
-          <a:prstGeom prst="rect">
-            <a:avLst/>
-          </a:prstGeom>
-        </p:spPr>
-      </p:pic>
-    </p:spTree>
-    <p:extLst>
-      <p:ext uri="{BB962C8B-B14F-4D97-AF65-F5344CB8AC3E}">
-        <p14:creationId xmlns:p14="http://schemas.microsoft.com/office/powerpoint/2010/main" val="307695250"/>
       </p:ext>
     </p:extLst>
   </p:cSld>

</xml_diff>